<commit_message>
updated project 1 planning
</commit_message>
<xml_diff>
--- a/presentations/ep1000_project_1/ep1000_template.pptx
+++ b/presentations/ep1000_project_1/ep1000_template.pptx
@@ -5,7 +5,7 @@
     <p:sldMasterId id="2147483660" r:id="rId1"/>
   </p:sldMasterIdLst>
   <p:notesMasterIdLst>
-    <p:notesMasterId r:id="rId11"/>
+    <p:notesMasterId r:id="rId14"/>
   </p:notesMasterIdLst>
   <p:sldIdLst>
     <p:sldId id="256" r:id="rId2"/>
@@ -15,8 +15,11 @@
     <p:sldId id="263" r:id="rId6"/>
     <p:sldId id="264" r:id="rId7"/>
     <p:sldId id="265" r:id="rId8"/>
-    <p:sldId id="266" r:id="rId9"/>
-    <p:sldId id="259" r:id="rId10"/>
+    <p:sldId id="267" r:id="rId9"/>
+    <p:sldId id="268" r:id="rId10"/>
+    <p:sldId id="269" r:id="rId11"/>
+    <p:sldId id="266" r:id="rId12"/>
+    <p:sldId id="259" r:id="rId13"/>
   </p:sldIdLst>
   <p:sldSz cx="9144000" cy="6858000" type="screen4x3"/>
   <p:notesSz cx="6858000" cy="9144000"/>
@@ -3577,6 +3580,419 @@
     <p:extLst>
       <p:ext uri="{BB962C8B-B14F-4D97-AF65-F5344CB8AC3E}">
         <p14:creationId xmlns:p14="http://schemas.microsoft.com/office/powerpoint/2010/main" val="1965181528"/>
+      </p:ext>
+    </p:extLst>
+  </p:cSld>
+  <p:clrMapOvr>
+    <a:masterClrMapping/>
+  </p:clrMapOvr>
+</p:sld>
+</file>
+
+<file path=ppt/slides/slide10.xml><?xml version="1.0" encoding="utf-8"?>
+<p:sld xmlns:a="http://schemas.openxmlformats.org/drawingml/2006/main" xmlns:r="http://schemas.openxmlformats.org/officeDocument/2006/relationships" xmlns:p="http://schemas.openxmlformats.org/presentationml/2006/main">
+  <p:cSld>
+    <p:spTree>
+      <p:nvGrpSpPr>
+        <p:cNvPr id="1" name=""/>
+        <p:cNvGrpSpPr/>
+        <p:nvPr/>
+      </p:nvGrpSpPr>
+      <p:grpSpPr>
+        <a:xfrm>
+          <a:off x="0" y="0"/>
+          <a:ext cx="0" cy="0"/>
+          <a:chOff x="0" y="0"/>
+          <a:chExt cx="0" cy="0"/>
+        </a:xfrm>
+      </p:grpSpPr>
+      <p:sp>
+        <p:nvSpPr>
+          <p:cNvPr id="2" name="Title 1"/>
+          <p:cNvSpPr>
+            <a:spLocks noGrp="1"/>
+          </p:cNvSpPr>
+          <p:nvPr>
+            <p:ph type="title"/>
+          </p:nvPr>
+        </p:nvSpPr>
+        <p:spPr/>
+        <p:txBody>
+          <a:bodyPr/>
+          <a:lstStyle/>
+          <a:p>
+            <a:r>
+              <a:rPr lang="en-SG" dirty="0" smtClean="0"/>
+              <a:t>Other considerations</a:t>
+            </a:r>
+            <a:endParaRPr lang="en-SG" dirty="0"/>
+          </a:p>
+        </p:txBody>
+      </p:sp>
+      <p:sp>
+        <p:nvSpPr>
+          <p:cNvPr id="4" name="Content Placeholder 3"/>
+          <p:cNvSpPr>
+            <a:spLocks noGrp="1"/>
+          </p:cNvSpPr>
+          <p:nvPr>
+            <p:ph idx="1"/>
+          </p:nvPr>
+        </p:nvSpPr>
+        <p:spPr>
+          <a:xfrm>
+            <a:off x="628650" y="1542596"/>
+            <a:ext cx="7886700" cy="4351338"/>
+          </a:xfrm>
+        </p:spPr>
+        <p:txBody>
+          <a:bodyPr/>
+          <a:lstStyle/>
+          <a:p>
+            <a:r>
+              <a:rPr lang="en-SG" dirty="0" smtClean="0"/>
+              <a:t>Pins vs Wires</a:t>
+            </a:r>
+          </a:p>
+          <a:p>
+            <a:pPr lvl="1"/>
+            <a:r>
+              <a:rPr lang="en-SG" dirty="0" smtClean="0"/>
+              <a:t>Pins need a mini-breadboard</a:t>
+            </a:r>
+          </a:p>
+          <a:p>
+            <a:pPr lvl="1"/>
+            <a:r>
+              <a:rPr lang="en-SG" dirty="0" smtClean="0"/>
+              <a:t>Wires need soldering (another skill?)</a:t>
+            </a:r>
+          </a:p>
+          <a:p>
+            <a:pPr lvl="1"/>
+            <a:r>
+              <a:rPr lang="en-SG" dirty="0" smtClean="0"/>
+              <a:t>May need multiple GND and Power</a:t>
+            </a:r>
+          </a:p>
+          <a:p>
+            <a:r>
+              <a:rPr lang="en-SG" dirty="0" smtClean="0"/>
+              <a:t>How to transfer code from UNO to Nano</a:t>
+            </a:r>
+          </a:p>
+          <a:p>
+            <a:r>
+              <a:rPr lang="en-SG" dirty="0" smtClean="0"/>
+              <a:t>Start, Stop, Pause buttons ?</a:t>
+            </a:r>
+          </a:p>
+          <a:p>
+            <a:r>
+              <a:rPr lang="en-SG" dirty="0" smtClean="0"/>
+              <a:t>Power considerations</a:t>
+            </a:r>
+          </a:p>
+          <a:p>
+            <a:pPr lvl="1"/>
+            <a:r>
+              <a:rPr lang="en-SG" dirty="0" smtClean="0"/>
+              <a:t>5V, GND</a:t>
+            </a:r>
+          </a:p>
+          <a:p>
+            <a:pPr lvl="1"/>
+            <a:r>
+              <a:rPr lang="en-SG" dirty="0" smtClean="0"/>
+              <a:t>Voltage regulation</a:t>
+            </a:r>
+          </a:p>
+          <a:p>
+            <a:pPr lvl="1"/>
+            <a:r>
+              <a:rPr lang="en-SG" dirty="0" smtClean="0"/>
+              <a:t>Power sockets (no USB connections)</a:t>
+            </a:r>
+          </a:p>
+          <a:p>
+            <a:pPr lvl="1"/>
+            <a:r>
+              <a:rPr lang="en-SG" dirty="0" smtClean="0"/>
+              <a:t>Indicators</a:t>
+            </a:r>
+            <a:endParaRPr lang="en-SG" dirty="0"/>
+          </a:p>
+        </p:txBody>
+      </p:sp>
+      <p:sp>
+        <p:nvSpPr>
+          <p:cNvPr id="3" name="Slide Number Placeholder 2"/>
+          <p:cNvSpPr>
+            <a:spLocks noGrp="1"/>
+          </p:cNvSpPr>
+          <p:nvPr>
+            <p:ph type="sldNum" sz="quarter" idx="12"/>
+          </p:nvPr>
+        </p:nvSpPr>
+        <p:spPr/>
+        <p:txBody>
+          <a:bodyPr/>
+          <a:lstStyle/>
+          <a:p>
+            <a:fld id="{CAB166B3-F268-4CEF-878A-CFB0D0D505D3}" type="slidenum">
+              <a:rPr lang="en-US" smtClean="0"/>
+              <a:t>10</a:t>
+            </a:fld>
+            <a:endParaRPr lang="en-US"/>
+          </a:p>
+        </p:txBody>
+      </p:sp>
+    </p:spTree>
+    <p:extLst>
+      <p:ext uri="{BB962C8B-B14F-4D97-AF65-F5344CB8AC3E}">
+        <p14:creationId xmlns:p14="http://schemas.microsoft.com/office/powerpoint/2010/main" val="3577191490"/>
+      </p:ext>
+    </p:extLst>
+  </p:cSld>
+  <p:clrMapOvr>
+    <a:masterClrMapping/>
+  </p:clrMapOvr>
+</p:sld>
+</file>
+
+<file path=ppt/slides/slide11.xml><?xml version="1.0" encoding="utf-8"?>
+<p:sld xmlns:a="http://schemas.openxmlformats.org/drawingml/2006/main" xmlns:r="http://schemas.openxmlformats.org/officeDocument/2006/relationships" xmlns:p="http://schemas.openxmlformats.org/presentationml/2006/main">
+  <p:cSld>
+    <p:spTree>
+      <p:nvGrpSpPr>
+        <p:cNvPr id="1" name=""/>
+        <p:cNvGrpSpPr/>
+        <p:nvPr/>
+      </p:nvGrpSpPr>
+      <p:grpSpPr>
+        <a:xfrm>
+          <a:off x="0" y="0"/>
+          <a:ext cx="0" cy="0"/>
+          <a:chOff x="0" y="0"/>
+          <a:chExt cx="0" cy="0"/>
+        </a:xfrm>
+      </p:grpSpPr>
+      <p:sp>
+        <p:nvSpPr>
+          <p:cNvPr id="2" name="Title 1"/>
+          <p:cNvSpPr>
+            <a:spLocks noGrp="1"/>
+          </p:cNvSpPr>
+          <p:nvPr>
+            <p:ph type="title"/>
+          </p:nvPr>
+        </p:nvSpPr>
+        <p:spPr/>
+        <p:txBody>
+          <a:bodyPr/>
+          <a:lstStyle/>
+          <a:p>
+            <a:r>
+              <a:rPr lang="en-SG" dirty="0" smtClean="0"/>
+              <a:t>Implement a design</a:t>
+            </a:r>
+            <a:endParaRPr lang="en-SG" dirty="0"/>
+          </a:p>
+        </p:txBody>
+      </p:sp>
+      <p:sp>
+        <p:nvSpPr>
+          <p:cNvPr id="3" name="Content Placeholder 2"/>
+          <p:cNvSpPr>
+            <a:spLocks noGrp="1"/>
+          </p:cNvSpPr>
+          <p:nvPr>
+            <p:ph idx="1"/>
+          </p:nvPr>
+        </p:nvSpPr>
+        <p:spPr/>
+        <p:txBody>
+          <a:bodyPr/>
+          <a:lstStyle/>
+          <a:p>
+            <a:r>
+              <a:rPr lang="en-SG" dirty="0" smtClean="0"/>
+              <a:t>Design drawn using Fusion 360</a:t>
+            </a:r>
+          </a:p>
+          <a:p>
+            <a:r>
+              <a:rPr lang="en-SG" dirty="0" smtClean="0"/>
+              <a:t>Learn how to assemble parts for fittings</a:t>
+            </a:r>
+          </a:p>
+          <a:p>
+            <a:r>
+              <a:rPr lang="en-SG" dirty="0" smtClean="0"/>
+              <a:t>Vector/Raster graphics for decals, labels, artwork</a:t>
+            </a:r>
+          </a:p>
+          <a:p>
+            <a:r>
+              <a:rPr lang="en-SG" dirty="0" smtClean="0"/>
+              <a:t>Documentation</a:t>
+            </a:r>
+          </a:p>
+          <a:p>
+            <a:pPr lvl="1"/>
+            <a:r>
+              <a:rPr lang="en-SG" dirty="0" smtClean="0"/>
+              <a:t>Include all RAW files (.f3d, .jpg, .</a:t>
+            </a:r>
+            <a:r>
+              <a:rPr lang="en-SG" dirty="0" err="1" smtClean="0"/>
+              <a:t>png</a:t>
+            </a:r>
+            <a:r>
+              <a:rPr lang="en-SG" dirty="0" smtClean="0"/>
+              <a:t>)</a:t>
+            </a:r>
+          </a:p>
+          <a:p>
+            <a:pPr lvl="1"/>
+            <a:r>
+              <a:rPr lang="en-SG" dirty="0" smtClean="0"/>
+              <a:t>Record machine settings</a:t>
+            </a:r>
+          </a:p>
+          <a:p>
+            <a:pPr lvl="1"/>
+            <a:r>
+              <a:rPr lang="en-SG" dirty="0" smtClean="0"/>
+              <a:t>Write up your work</a:t>
+            </a:r>
+            <a:endParaRPr lang="en-SG" dirty="0"/>
+          </a:p>
+        </p:txBody>
+      </p:sp>
+      <p:sp>
+        <p:nvSpPr>
+          <p:cNvPr id="4" name="Slide Number Placeholder 3"/>
+          <p:cNvSpPr>
+            <a:spLocks noGrp="1"/>
+          </p:cNvSpPr>
+          <p:nvPr>
+            <p:ph type="sldNum" sz="quarter" idx="12"/>
+          </p:nvPr>
+        </p:nvSpPr>
+        <p:spPr/>
+        <p:txBody>
+          <a:bodyPr/>
+          <a:lstStyle/>
+          <a:p>
+            <a:fld id="{CAB166B3-F268-4CEF-878A-CFB0D0D505D3}" type="slidenum">
+              <a:rPr lang="en-US" smtClean="0"/>
+              <a:t>11</a:t>
+            </a:fld>
+            <a:endParaRPr lang="en-US"/>
+          </a:p>
+        </p:txBody>
+      </p:sp>
+    </p:spTree>
+    <p:extLst>
+      <p:ext uri="{BB962C8B-B14F-4D97-AF65-F5344CB8AC3E}">
+        <p14:creationId xmlns:p14="http://schemas.microsoft.com/office/powerpoint/2010/main" val="105712155"/>
+      </p:ext>
+    </p:extLst>
+  </p:cSld>
+  <p:clrMapOvr>
+    <a:masterClrMapping/>
+  </p:clrMapOvr>
+</p:sld>
+</file>
+
+<file path=ppt/slides/slide12.xml><?xml version="1.0" encoding="utf-8"?>
+<p:sld xmlns:a="http://schemas.openxmlformats.org/drawingml/2006/main" xmlns:r="http://schemas.openxmlformats.org/officeDocument/2006/relationships" xmlns:p="http://schemas.openxmlformats.org/presentationml/2006/main">
+  <p:cSld>
+    <p:spTree>
+      <p:nvGrpSpPr>
+        <p:cNvPr id="1" name=""/>
+        <p:cNvGrpSpPr/>
+        <p:nvPr/>
+      </p:nvGrpSpPr>
+      <p:grpSpPr>
+        <a:xfrm>
+          <a:off x="0" y="0"/>
+          <a:ext cx="0" cy="0"/>
+          <a:chOff x="0" y="0"/>
+          <a:chExt cx="0" cy="0"/>
+        </a:xfrm>
+      </p:grpSpPr>
+      <p:sp>
+        <p:nvSpPr>
+          <p:cNvPr id="2" name="Title 1">
+            <a:extLst>
+              <a:ext uri="{FF2B5EF4-FFF2-40B4-BE49-F238E27FC236}">
+                <a16:creationId xmlns:a16="http://schemas.microsoft.com/office/drawing/2014/main" id="{29757EC0-C4C7-4C21-8BBD-162462AD095F}"/>
+              </a:ext>
+            </a:extLst>
+          </p:cNvPr>
+          <p:cNvSpPr>
+            <a:spLocks noGrp="1"/>
+          </p:cNvSpPr>
+          <p:nvPr>
+            <p:ph type="ctrTitle"/>
+          </p:nvPr>
+        </p:nvSpPr>
+        <p:spPr/>
+        <p:txBody>
+          <a:bodyPr/>
+          <a:lstStyle/>
+          <a:p>
+            <a:r>
+              <a:rPr lang="en-US" dirty="0"/>
+              <a:t>EP1000</a:t>
+            </a:r>
+          </a:p>
+        </p:txBody>
+      </p:sp>
+      <p:sp>
+        <p:nvSpPr>
+          <p:cNvPr id="3" name="Subtitle 2">
+            <a:extLst>
+              <a:ext uri="{FF2B5EF4-FFF2-40B4-BE49-F238E27FC236}">
+                <a16:creationId xmlns:a16="http://schemas.microsoft.com/office/drawing/2014/main" id="{1F579C3D-8773-4BAF-B0E2-847945ECA23E}"/>
+              </a:ext>
+            </a:extLst>
+          </p:cNvPr>
+          <p:cNvSpPr>
+            <a:spLocks noGrp="1"/>
+          </p:cNvSpPr>
+          <p:nvPr>
+            <p:ph type="subTitle" idx="1"/>
+          </p:nvPr>
+        </p:nvSpPr>
+        <p:spPr/>
+        <p:txBody>
+          <a:bodyPr/>
+          <a:lstStyle/>
+          <a:p>
+            <a:r>
+              <a:rPr lang="en-US" dirty="0"/>
+              <a:t>Project-1-Planning</a:t>
+            </a:r>
+          </a:p>
+          <a:p>
+            <a:r>
+              <a:rPr lang="en-US" dirty="0">
+                <a:solidFill>
+                  <a:srgbClr val="FF0000"/>
+                </a:solidFill>
+              </a:rPr>
+              <a:t>End</a:t>
+            </a:r>
+          </a:p>
+        </p:txBody>
+      </p:sp>
+    </p:spTree>
+    <p:extLst>
+      <p:ext uri="{BB962C8B-B14F-4D97-AF65-F5344CB8AC3E}">
+        <p14:creationId xmlns:p14="http://schemas.microsoft.com/office/powerpoint/2010/main" val="2293809126"/>
       </p:ext>
     </p:extLst>
   </p:cSld>
@@ -5720,7 +6136,7 @@
       </p:grpSpPr>
       <p:sp>
         <p:nvSpPr>
-          <p:cNvPr id="2" name="Title 1"/>
+          <p:cNvPr id="5" name="Title 4"/>
           <p:cNvSpPr>
             <a:spLocks noGrp="1"/>
           </p:cNvSpPr>
@@ -5735,77 +6151,7 @@
           <a:p>
             <a:r>
               <a:rPr lang="en-SG" dirty="0" smtClean="0"/>
-              <a:t>Implement a design</a:t>
-            </a:r>
-            <a:endParaRPr lang="en-SG" dirty="0"/>
-          </a:p>
-        </p:txBody>
-      </p:sp>
-      <p:sp>
-        <p:nvSpPr>
-          <p:cNvPr id="3" name="Content Placeholder 2"/>
-          <p:cNvSpPr>
-            <a:spLocks noGrp="1"/>
-          </p:cNvSpPr>
-          <p:nvPr>
-            <p:ph idx="1"/>
-          </p:nvPr>
-        </p:nvSpPr>
-        <p:spPr/>
-        <p:txBody>
-          <a:bodyPr/>
-          <a:lstStyle/>
-          <a:p>
-            <a:r>
-              <a:rPr lang="en-SG" dirty="0" smtClean="0"/>
-              <a:t>Design drawn using Fusion 360</a:t>
-            </a:r>
-          </a:p>
-          <a:p>
-            <a:r>
-              <a:rPr lang="en-SG" dirty="0" smtClean="0"/>
-              <a:t>Learn how to assemble parts for fittings</a:t>
-            </a:r>
-          </a:p>
-          <a:p>
-            <a:r>
-              <a:rPr lang="en-SG" dirty="0" smtClean="0"/>
-              <a:t>Vector/Raster graphics for decals, labels, artwork</a:t>
-            </a:r>
-          </a:p>
-          <a:p>
-            <a:r>
-              <a:rPr lang="en-SG" dirty="0" smtClean="0"/>
-              <a:t>Documentation</a:t>
-            </a:r>
-          </a:p>
-          <a:p>
-            <a:pPr lvl="1"/>
-            <a:r>
-              <a:rPr lang="en-SG" dirty="0" smtClean="0"/>
-              <a:t>Include all RAW files (.f3d, .jpg, .</a:t>
-            </a:r>
-            <a:r>
-              <a:rPr lang="en-SG" dirty="0" err="1" smtClean="0"/>
-              <a:t>png</a:t>
-            </a:r>
-            <a:r>
-              <a:rPr lang="en-SG" dirty="0" smtClean="0"/>
-              <a:t>)</a:t>
-            </a:r>
-          </a:p>
-          <a:p>
-            <a:pPr lvl="1"/>
-            <a:r>
-              <a:rPr lang="en-SG" dirty="0" smtClean="0"/>
-              <a:t>Record machine settings</a:t>
-            </a:r>
-          </a:p>
-          <a:p>
-            <a:pPr lvl="1"/>
-            <a:r>
-              <a:rPr lang="en-SG" dirty="0" smtClean="0"/>
-              <a:t>Write up your work</a:t>
+              <a:t>Physical Design</a:t>
             </a:r>
             <a:endParaRPr lang="en-SG" dirty="0"/>
           </a:p>
@@ -5834,10 +6180,743 @@
           </a:p>
         </p:txBody>
       </p:sp>
+      <p:grpSp>
+        <p:nvGrpSpPr>
+          <p:cNvPr id="15" name="Group 14"/>
+          <p:cNvGrpSpPr/>
+          <p:nvPr/>
+        </p:nvGrpSpPr>
+        <p:grpSpPr>
+          <a:xfrm>
+            <a:off x="874206" y="2935016"/>
+            <a:ext cx="3165230" cy="1055077"/>
+            <a:chOff x="874207" y="2029767"/>
+            <a:chExt cx="3165230" cy="1055077"/>
+          </a:xfrm>
+        </p:grpSpPr>
+        <p:sp>
+          <p:nvSpPr>
+            <p:cNvPr id="7" name="Rectangle 6"/>
+            <p:cNvSpPr/>
+            <p:nvPr/>
+          </p:nvSpPr>
+          <p:spPr>
+            <a:xfrm>
+              <a:off x="874207" y="2029767"/>
+              <a:ext cx="3165230" cy="1055077"/>
+            </a:xfrm>
+            <a:prstGeom prst="rect">
+              <a:avLst/>
+            </a:prstGeom>
+            <a:noFill/>
+            <a:ln w="19050">
+              <a:solidFill>
+                <a:schemeClr val="tx1"/>
+              </a:solidFill>
+            </a:ln>
+          </p:spPr>
+          <p:style>
+            <a:lnRef idx="2">
+              <a:schemeClr val="accent1">
+                <a:shade val="50000"/>
+              </a:schemeClr>
+            </a:lnRef>
+            <a:fillRef idx="1">
+              <a:schemeClr val="accent1"/>
+            </a:fillRef>
+            <a:effectRef idx="0">
+              <a:schemeClr val="accent1"/>
+            </a:effectRef>
+            <a:fontRef idx="minor">
+              <a:schemeClr val="lt1"/>
+            </a:fontRef>
+          </p:style>
+          <p:txBody>
+            <a:bodyPr rtlCol="0" anchor="ctr"/>
+            <a:lstStyle/>
+            <a:p>
+              <a:pPr algn="ctr"/>
+              <a:endParaRPr lang="en-SG" dirty="0" smtClean="0">
+                <a:solidFill>
+                  <a:schemeClr val="tx1"/>
+                </a:solidFill>
+              </a:endParaRPr>
+            </a:p>
+          </p:txBody>
+        </p:sp>
+        <p:sp>
+          <p:nvSpPr>
+            <p:cNvPr id="8" name="Rounded Rectangle 7"/>
+            <p:cNvSpPr/>
+            <p:nvPr/>
+          </p:nvSpPr>
+          <p:spPr>
+            <a:xfrm>
+              <a:off x="1065125" y="2291024"/>
+              <a:ext cx="1617785" cy="532562"/>
+            </a:xfrm>
+            <a:prstGeom prst="roundRect">
+              <a:avLst/>
+            </a:prstGeom>
+            <a:solidFill>
+              <a:schemeClr val="accent6">
+                <a:lumMod val="75000"/>
+              </a:schemeClr>
+            </a:solidFill>
+            <a:ln w="19050">
+              <a:solidFill>
+                <a:schemeClr val="tx1"/>
+              </a:solidFill>
+            </a:ln>
+          </p:spPr>
+          <p:style>
+            <a:lnRef idx="2">
+              <a:schemeClr val="accent1">
+                <a:shade val="50000"/>
+              </a:schemeClr>
+            </a:lnRef>
+            <a:fillRef idx="1">
+              <a:schemeClr val="accent1"/>
+            </a:fillRef>
+            <a:effectRef idx="0">
+              <a:schemeClr val="accent1"/>
+            </a:effectRef>
+            <a:fontRef idx="minor">
+              <a:schemeClr val="lt1"/>
+            </a:fontRef>
+          </p:style>
+          <p:txBody>
+            <a:bodyPr rtlCol="0" anchor="ctr"/>
+            <a:lstStyle/>
+            <a:p>
+              <a:pPr algn="ctr"/>
+              <a:r>
+                <a:rPr lang="en-SG" dirty="0" smtClean="0">
+                  <a:solidFill>
+                    <a:schemeClr val="bg1"/>
+                  </a:solidFill>
+                </a:rPr>
+                <a:t>LCD 80x36</a:t>
+              </a:r>
+              <a:endParaRPr lang="en-SG" dirty="0" smtClean="0">
+                <a:solidFill>
+                  <a:schemeClr val="bg1"/>
+                </a:solidFill>
+              </a:endParaRPr>
+            </a:p>
+          </p:txBody>
+        </p:sp>
+      </p:grpSp>
+      <p:grpSp>
+        <p:nvGrpSpPr>
+          <p:cNvPr id="11" name="Group 10"/>
+          <p:cNvGrpSpPr/>
+          <p:nvPr/>
+        </p:nvGrpSpPr>
+        <p:grpSpPr>
+          <a:xfrm>
+            <a:off x="874206" y="1773391"/>
+            <a:ext cx="2359177" cy="836100"/>
+            <a:chOff x="874207" y="3346102"/>
+            <a:chExt cx="2359177" cy="836100"/>
+          </a:xfrm>
+        </p:grpSpPr>
+        <p:sp>
+          <p:nvSpPr>
+            <p:cNvPr id="9" name="Rectangle 8"/>
+            <p:cNvSpPr/>
+            <p:nvPr/>
+          </p:nvSpPr>
+          <p:spPr>
+            <a:xfrm>
+              <a:off x="874207" y="3346102"/>
+              <a:ext cx="2359177" cy="836100"/>
+            </a:xfrm>
+            <a:prstGeom prst="rect">
+              <a:avLst/>
+            </a:prstGeom>
+            <a:noFill/>
+            <a:ln w="19050">
+              <a:solidFill>
+                <a:schemeClr val="tx1"/>
+              </a:solidFill>
+            </a:ln>
+          </p:spPr>
+          <p:style>
+            <a:lnRef idx="2">
+              <a:schemeClr val="accent1">
+                <a:shade val="50000"/>
+              </a:schemeClr>
+            </a:lnRef>
+            <a:fillRef idx="1">
+              <a:schemeClr val="accent1"/>
+            </a:fillRef>
+            <a:effectRef idx="0">
+              <a:schemeClr val="accent1"/>
+            </a:effectRef>
+            <a:fontRef idx="minor">
+              <a:schemeClr val="lt1"/>
+            </a:fontRef>
+          </p:style>
+          <p:txBody>
+            <a:bodyPr rtlCol="0" anchor="ctr"/>
+            <a:lstStyle/>
+            <a:p>
+              <a:pPr algn="ctr"/>
+              <a:endParaRPr lang="en-SG" dirty="0" smtClean="0">
+                <a:solidFill>
+                  <a:schemeClr val="tx1"/>
+                </a:solidFill>
+              </a:endParaRPr>
+            </a:p>
+          </p:txBody>
+        </p:sp>
+        <p:sp>
+          <p:nvSpPr>
+            <p:cNvPr id="10" name="Rounded Rectangle 9"/>
+            <p:cNvSpPr/>
+            <p:nvPr/>
+          </p:nvSpPr>
+          <p:spPr>
+            <a:xfrm>
+              <a:off x="1065125" y="3526971"/>
+              <a:ext cx="1205802" cy="422031"/>
+            </a:xfrm>
+            <a:prstGeom prst="roundRect">
+              <a:avLst/>
+            </a:prstGeom>
+            <a:solidFill>
+              <a:schemeClr val="tx1">
+                <a:lumMod val="95000"/>
+                <a:lumOff val="5000"/>
+              </a:schemeClr>
+            </a:solidFill>
+            <a:ln w="19050">
+              <a:solidFill>
+                <a:schemeClr val="tx1"/>
+              </a:solidFill>
+            </a:ln>
+          </p:spPr>
+          <p:style>
+            <a:lnRef idx="2">
+              <a:schemeClr val="accent1">
+                <a:shade val="50000"/>
+              </a:schemeClr>
+            </a:lnRef>
+            <a:fillRef idx="1">
+              <a:schemeClr val="accent1"/>
+            </a:fillRef>
+            <a:effectRef idx="0">
+              <a:schemeClr val="accent1"/>
+            </a:effectRef>
+            <a:fontRef idx="minor">
+              <a:schemeClr val="lt1"/>
+            </a:fontRef>
+          </p:style>
+          <p:txBody>
+            <a:bodyPr rtlCol="0" anchor="ctr"/>
+            <a:lstStyle/>
+            <a:p>
+              <a:pPr algn="ctr"/>
+              <a:r>
+                <a:rPr lang="en-SG" sz="2400" dirty="0" smtClean="0">
+                  <a:solidFill>
+                    <a:srgbClr val="FF0000"/>
+                  </a:solidFill>
+                  <a:latin typeface="Arial Black" panose="020B0A04020102020204" pitchFamily="34" charset="0"/>
+                </a:rPr>
+                <a:t>1637</a:t>
+              </a:r>
+              <a:endParaRPr lang="en-SG" sz="2400" dirty="0" smtClean="0">
+                <a:solidFill>
+                  <a:srgbClr val="FF0000"/>
+                </a:solidFill>
+                <a:latin typeface="Arial Black" panose="020B0A04020102020204" pitchFamily="34" charset="0"/>
+              </a:endParaRPr>
+            </a:p>
+          </p:txBody>
+        </p:sp>
+      </p:grpSp>
+      <p:grpSp>
+        <p:nvGrpSpPr>
+          <p:cNvPr id="14" name="Group 13"/>
+          <p:cNvGrpSpPr/>
+          <p:nvPr/>
+        </p:nvGrpSpPr>
+        <p:grpSpPr>
+          <a:xfrm>
+            <a:off x="874206" y="4352677"/>
+            <a:ext cx="5747657" cy="1436914"/>
+            <a:chOff x="874206" y="4360985"/>
+            <a:chExt cx="5747657" cy="1436914"/>
+          </a:xfrm>
+        </p:grpSpPr>
+        <p:sp>
+          <p:nvSpPr>
+            <p:cNvPr id="12" name="Rectangle 11"/>
+            <p:cNvSpPr/>
+            <p:nvPr/>
+          </p:nvSpPr>
+          <p:spPr>
+            <a:xfrm>
+              <a:off x="874206" y="4360985"/>
+              <a:ext cx="5747657" cy="1436914"/>
+            </a:xfrm>
+            <a:prstGeom prst="rect">
+              <a:avLst/>
+            </a:prstGeom>
+            <a:noFill/>
+            <a:ln w="19050">
+              <a:solidFill>
+                <a:schemeClr val="tx1"/>
+              </a:solidFill>
+            </a:ln>
+          </p:spPr>
+          <p:style>
+            <a:lnRef idx="2">
+              <a:schemeClr val="accent1">
+                <a:shade val="50000"/>
+              </a:schemeClr>
+            </a:lnRef>
+            <a:fillRef idx="1">
+              <a:schemeClr val="accent1"/>
+            </a:fillRef>
+            <a:effectRef idx="0">
+              <a:schemeClr val="accent1"/>
+            </a:effectRef>
+            <a:fontRef idx="minor">
+              <a:schemeClr val="lt1"/>
+            </a:fontRef>
+          </p:style>
+          <p:txBody>
+            <a:bodyPr rtlCol="0" anchor="ctr"/>
+            <a:lstStyle/>
+            <a:p>
+              <a:pPr algn="ctr"/>
+              <a:endParaRPr lang="en-SG" dirty="0" smtClean="0">
+                <a:solidFill>
+                  <a:schemeClr val="tx1"/>
+                </a:solidFill>
+              </a:endParaRPr>
+            </a:p>
+          </p:txBody>
+        </p:sp>
+        <p:pic>
+          <p:nvPicPr>
+            <p:cNvPr id="13" name="Picture 12"/>
+            <p:cNvPicPr>
+              <a:picLocks noChangeAspect="1"/>
+            </p:cNvPicPr>
+            <p:nvPr/>
+          </p:nvPicPr>
+          <p:blipFill>
+            <a:blip r:embed="rId2"/>
+            <a:stretch>
+              <a:fillRect/>
+            </a:stretch>
+          </p:blipFill>
+          <p:spPr>
+            <a:xfrm>
+              <a:off x="1372607" y="4543890"/>
+              <a:ext cx="4596113" cy="1071104"/>
+            </a:xfrm>
+            <a:prstGeom prst="rect">
+              <a:avLst/>
+            </a:prstGeom>
+          </p:spPr>
+        </p:pic>
+      </p:grpSp>
+      <p:cxnSp>
+        <p:nvCxnSpPr>
+          <p:cNvPr id="17" name="Straight Arrow Connector 16"/>
+          <p:cNvCxnSpPr/>
+          <p:nvPr/>
+        </p:nvCxnSpPr>
+        <p:spPr>
+          <a:xfrm>
+            <a:off x="770160" y="1773391"/>
+            <a:ext cx="0" cy="836100"/>
+          </a:xfrm>
+          <a:prstGeom prst="straightConnector1">
+            <a:avLst/>
+          </a:prstGeom>
+          <a:ln w="19050">
+            <a:solidFill>
+              <a:schemeClr val="tx1"/>
+            </a:solidFill>
+            <a:headEnd type="triangle" w="med" len="med"/>
+            <a:tailEnd type="triangle"/>
+          </a:ln>
+        </p:spPr>
+        <p:style>
+          <a:lnRef idx="1">
+            <a:schemeClr val="accent1"/>
+          </a:lnRef>
+          <a:fillRef idx="0">
+            <a:schemeClr val="accent1"/>
+          </a:fillRef>
+          <a:effectRef idx="0">
+            <a:schemeClr val="accent1"/>
+          </a:effectRef>
+          <a:fontRef idx="minor">
+            <a:schemeClr val="tx1"/>
+          </a:fontRef>
+        </p:style>
+      </p:cxnSp>
+      <p:sp>
+        <p:nvSpPr>
+          <p:cNvPr id="18" name="TextBox 17"/>
+          <p:cNvSpPr txBox="1"/>
+          <p:nvPr/>
+        </p:nvSpPr>
+        <p:spPr>
+          <a:xfrm>
+            <a:off x="163796" y="2037552"/>
+            <a:ext cx="652743" cy="307777"/>
+          </a:xfrm>
+          <a:prstGeom prst="rect">
+            <a:avLst/>
+          </a:prstGeom>
+          <a:noFill/>
+        </p:spPr>
+        <p:txBody>
+          <a:bodyPr wrap="none" rtlCol="0">
+            <a:spAutoFit/>
+          </a:bodyPr>
+          <a:lstStyle/>
+          <a:p>
+            <a:r>
+              <a:rPr lang="en-SG" sz="1400" dirty="0" smtClean="0"/>
+              <a:t>40mm</a:t>
+            </a:r>
+            <a:endParaRPr lang="en-SG" sz="1400" dirty="0"/>
+          </a:p>
+        </p:txBody>
+      </p:sp>
+      <p:cxnSp>
+        <p:nvCxnSpPr>
+          <p:cNvPr id="19" name="Straight Arrow Connector 18"/>
+          <p:cNvCxnSpPr/>
+          <p:nvPr/>
+        </p:nvCxnSpPr>
+        <p:spPr>
+          <a:xfrm>
+            <a:off x="770160" y="2935016"/>
+            <a:ext cx="0" cy="1055077"/>
+          </a:xfrm>
+          <a:prstGeom prst="straightConnector1">
+            <a:avLst/>
+          </a:prstGeom>
+          <a:ln w="19050">
+            <a:solidFill>
+              <a:schemeClr val="tx1"/>
+            </a:solidFill>
+            <a:headEnd type="triangle" w="med" len="med"/>
+            <a:tailEnd type="triangle"/>
+          </a:ln>
+        </p:spPr>
+        <p:style>
+          <a:lnRef idx="1">
+            <a:schemeClr val="accent1"/>
+          </a:lnRef>
+          <a:fillRef idx="0">
+            <a:schemeClr val="accent1"/>
+          </a:fillRef>
+          <a:effectRef idx="0">
+            <a:schemeClr val="accent1"/>
+          </a:effectRef>
+          <a:fontRef idx="minor">
+            <a:schemeClr val="tx1"/>
+          </a:fontRef>
+        </p:style>
+      </p:cxnSp>
+      <p:sp>
+        <p:nvSpPr>
+          <p:cNvPr id="20" name="TextBox 19"/>
+          <p:cNvSpPr txBox="1"/>
+          <p:nvPr/>
+        </p:nvSpPr>
+        <p:spPr>
+          <a:xfrm>
+            <a:off x="163796" y="3311180"/>
+            <a:ext cx="652743" cy="307777"/>
+          </a:xfrm>
+          <a:prstGeom prst="rect">
+            <a:avLst/>
+          </a:prstGeom>
+          <a:noFill/>
+        </p:spPr>
+        <p:txBody>
+          <a:bodyPr wrap="none" rtlCol="0">
+            <a:spAutoFit/>
+          </a:bodyPr>
+          <a:lstStyle/>
+          <a:p>
+            <a:r>
+              <a:rPr lang="en-SG" sz="1400" dirty="0" smtClean="0"/>
+              <a:t>60mm</a:t>
+            </a:r>
+            <a:endParaRPr lang="en-SG" sz="1400" dirty="0"/>
+          </a:p>
+        </p:txBody>
+      </p:sp>
+      <p:cxnSp>
+        <p:nvCxnSpPr>
+          <p:cNvPr id="23" name="Straight Arrow Connector 22"/>
+          <p:cNvCxnSpPr/>
+          <p:nvPr/>
+        </p:nvCxnSpPr>
+        <p:spPr>
+          <a:xfrm>
+            <a:off x="770160" y="4352677"/>
+            <a:ext cx="0" cy="1436914"/>
+          </a:xfrm>
+          <a:prstGeom prst="straightConnector1">
+            <a:avLst/>
+          </a:prstGeom>
+          <a:ln w="19050">
+            <a:solidFill>
+              <a:schemeClr val="tx1"/>
+            </a:solidFill>
+            <a:headEnd type="triangle" w="med" len="med"/>
+            <a:tailEnd type="triangle"/>
+          </a:ln>
+        </p:spPr>
+        <p:style>
+          <a:lnRef idx="1">
+            <a:schemeClr val="accent1"/>
+          </a:lnRef>
+          <a:fillRef idx="0">
+            <a:schemeClr val="accent1"/>
+          </a:fillRef>
+          <a:effectRef idx="0">
+            <a:schemeClr val="accent1"/>
+          </a:effectRef>
+          <a:fontRef idx="minor">
+            <a:schemeClr val="tx1"/>
+          </a:fontRef>
+        </p:style>
+      </p:cxnSp>
+      <p:sp>
+        <p:nvSpPr>
+          <p:cNvPr id="24" name="TextBox 23"/>
+          <p:cNvSpPr txBox="1"/>
+          <p:nvPr/>
+        </p:nvSpPr>
+        <p:spPr>
+          <a:xfrm>
+            <a:off x="163796" y="4927773"/>
+            <a:ext cx="652743" cy="307777"/>
+          </a:xfrm>
+          <a:prstGeom prst="rect">
+            <a:avLst/>
+          </a:prstGeom>
+          <a:noFill/>
+        </p:spPr>
+        <p:txBody>
+          <a:bodyPr wrap="none" rtlCol="0">
+            <a:spAutoFit/>
+          </a:bodyPr>
+          <a:lstStyle/>
+          <a:p>
+            <a:r>
+              <a:rPr lang="en-SG" sz="1400" dirty="0"/>
+              <a:t>8</a:t>
+            </a:r>
+            <a:r>
+              <a:rPr lang="en-SG" sz="1400" dirty="0" smtClean="0"/>
+              <a:t>0mm</a:t>
+            </a:r>
+            <a:endParaRPr lang="en-SG" sz="1400" dirty="0"/>
+          </a:p>
+        </p:txBody>
+      </p:sp>
+      <p:cxnSp>
+        <p:nvCxnSpPr>
+          <p:cNvPr id="27" name="Straight Arrow Connector 26"/>
+          <p:cNvCxnSpPr/>
+          <p:nvPr/>
+        </p:nvCxnSpPr>
+        <p:spPr>
+          <a:xfrm>
+            <a:off x="874206" y="5916772"/>
+            <a:ext cx="5747657" cy="0"/>
+          </a:xfrm>
+          <a:prstGeom prst="straightConnector1">
+            <a:avLst/>
+          </a:prstGeom>
+          <a:ln w="19050">
+            <a:solidFill>
+              <a:schemeClr val="tx1"/>
+            </a:solidFill>
+            <a:headEnd type="triangle" w="med" len="med"/>
+            <a:tailEnd type="triangle"/>
+          </a:ln>
+        </p:spPr>
+        <p:style>
+          <a:lnRef idx="1">
+            <a:schemeClr val="accent1"/>
+          </a:lnRef>
+          <a:fillRef idx="0">
+            <a:schemeClr val="accent1"/>
+          </a:fillRef>
+          <a:effectRef idx="0">
+            <a:schemeClr val="accent1"/>
+          </a:effectRef>
+          <a:fontRef idx="minor">
+            <a:schemeClr val="tx1"/>
+          </a:fontRef>
+        </p:style>
+      </p:cxnSp>
+      <p:sp>
+        <p:nvSpPr>
+          <p:cNvPr id="29" name="TextBox 28"/>
+          <p:cNvSpPr txBox="1"/>
+          <p:nvPr/>
+        </p:nvSpPr>
+        <p:spPr>
+          <a:xfrm>
+            <a:off x="3194560" y="5916772"/>
+            <a:ext cx="744114" cy="307777"/>
+          </a:xfrm>
+          <a:prstGeom prst="rect">
+            <a:avLst/>
+          </a:prstGeom>
+          <a:noFill/>
+        </p:spPr>
+        <p:txBody>
+          <a:bodyPr wrap="none" rtlCol="0">
+            <a:spAutoFit/>
+          </a:bodyPr>
+          <a:lstStyle/>
+          <a:p>
+            <a:r>
+              <a:rPr lang="en-SG" sz="1400" dirty="0" smtClean="0"/>
+              <a:t>180mm</a:t>
+            </a:r>
+            <a:endParaRPr lang="en-SG" sz="1400" dirty="0"/>
+          </a:p>
+        </p:txBody>
+      </p:sp>
+      <p:sp>
+        <p:nvSpPr>
+          <p:cNvPr id="30" name="TextBox 29"/>
+          <p:cNvSpPr txBox="1"/>
+          <p:nvPr/>
+        </p:nvSpPr>
+        <p:spPr>
+          <a:xfrm>
+            <a:off x="2053794" y="3953447"/>
+            <a:ext cx="744114" cy="307777"/>
+          </a:xfrm>
+          <a:prstGeom prst="rect">
+            <a:avLst/>
+          </a:prstGeom>
+          <a:noFill/>
+        </p:spPr>
+        <p:txBody>
+          <a:bodyPr wrap="none" rtlCol="0">
+            <a:spAutoFit/>
+          </a:bodyPr>
+          <a:lstStyle/>
+          <a:p>
+            <a:r>
+              <a:rPr lang="en-SG" sz="1400" dirty="0" smtClean="0"/>
+              <a:t>100mm</a:t>
+            </a:r>
+            <a:endParaRPr lang="en-SG" sz="1400" dirty="0"/>
+          </a:p>
+        </p:txBody>
+      </p:sp>
+      <p:sp>
+        <p:nvSpPr>
+          <p:cNvPr id="31" name="TextBox 30"/>
+          <p:cNvSpPr txBox="1"/>
+          <p:nvPr/>
+        </p:nvSpPr>
+        <p:spPr>
+          <a:xfrm>
+            <a:off x="1668025" y="2581512"/>
+            <a:ext cx="652743" cy="307777"/>
+          </a:xfrm>
+          <a:prstGeom prst="rect">
+            <a:avLst/>
+          </a:prstGeom>
+          <a:noFill/>
+        </p:spPr>
+        <p:txBody>
+          <a:bodyPr wrap="none" rtlCol="0">
+            <a:spAutoFit/>
+          </a:bodyPr>
+          <a:lstStyle/>
+          <a:p>
+            <a:r>
+              <a:rPr lang="en-SG" sz="1400" dirty="0"/>
+              <a:t>8</a:t>
+            </a:r>
+            <a:r>
+              <a:rPr lang="en-SG" sz="1400" dirty="0" smtClean="0"/>
+              <a:t>0mm</a:t>
+            </a:r>
+            <a:endParaRPr lang="en-SG" sz="1400" dirty="0"/>
+          </a:p>
+        </p:txBody>
+      </p:sp>
+      <p:sp>
+        <p:nvSpPr>
+          <p:cNvPr id="32" name="TextBox 31"/>
+          <p:cNvSpPr txBox="1"/>
+          <p:nvPr/>
+        </p:nvSpPr>
+        <p:spPr>
+          <a:xfrm>
+            <a:off x="4680858" y="2376291"/>
+            <a:ext cx="2971800" cy="1477328"/>
+          </a:xfrm>
+          <a:prstGeom prst="rect">
+            <a:avLst/>
+          </a:prstGeom>
+          <a:noFill/>
+        </p:spPr>
+        <p:txBody>
+          <a:bodyPr wrap="square" rtlCol="0">
+            <a:spAutoFit/>
+          </a:bodyPr>
+          <a:lstStyle/>
+          <a:p>
+            <a:r>
+              <a:rPr lang="en-SG" dirty="0" smtClean="0"/>
+              <a:t>Deciding on your components affects the size and shape of your physical system</a:t>
+            </a:r>
+          </a:p>
+          <a:p>
+            <a:endParaRPr lang="en-SG" dirty="0"/>
+          </a:p>
+          <a:p>
+            <a:r>
+              <a:rPr lang="en-SG" dirty="0" smtClean="0"/>
+              <a:t>Do a </a:t>
+            </a:r>
+            <a:r>
+              <a:rPr lang="en-SG" dirty="0" smtClean="0">
+                <a:solidFill>
+                  <a:srgbClr val="FF0000"/>
+                </a:solidFill>
+              </a:rPr>
+              <a:t>MOCK UP!</a:t>
+            </a:r>
+            <a:endParaRPr lang="en-SG" dirty="0">
+              <a:solidFill>
+                <a:srgbClr val="FF0000"/>
+              </a:solidFill>
+            </a:endParaRPr>
+          </a:p>
+        </p:txBody>
+      </p:sp>
     </p:spTree>
     <p:extLst>
       <p:ext uri="{BB962C8B-B14F-4D97-AF65-F5344CB8AC3E}">
-        <p14:creationId xmlns:p14="http://schemas.microsoft.com/office/powerpoint/2010/main" val="105712155"/>
+        <p14:creationId xmlns:p14="http://schemas.microsoft.com/office/powerpoint/2010/main" val="116629758"/>
       </p:ext>
     </p:extLst>
   </p:cSld>
@@ -5866,18 +6945,12 @@
       </p:grpSpPr>
       <p:sp>
         <p:nvSpPr>
-          <p:cNvPr id="2" name="Title 1">
-            <a:extLst>
-              <a:ext uri="{FF2B5EF4-FFF2-40B4-BE49-F238E27FC236}">
-                <a16:creationId xmlns:a16="http://schemas.microsoft.com/office/drawing/2014/main" id="{29757EC0-C4C7-4C21-8BBD-162462AD095F}"/>
-              </a:ext>
-            </a:extLst>
-          </p:cNvPr>
-          <p:cNvSpPr>
-            <a:spLocks noGrp="1"/>
-          </p:cNvSpPr>
-          <p:nvPr>
-            <p:ph type="ctrTitle"/>
+          <p:cNvPr id="2" name="Title 1"/>
+          <p:cNvSpPr>
+            <a:spLocks noGrp="1"/>
+          </p:cNvSpPr>
+          <p:nvPr>
+            <p:ph type="title"/>
           </p:nvPr>
         </p:nvSpPr>
         <p:spPr/>
@@ -5886,26 +6959,21 @@
           <a:lstStyle/>
           <a:p>
             <a:r>
-              <a:rPr lang="en-US" dirty="0"/>
-              <a:t>EP1000</a:t>
-            </a:r>
-          </a:p>
-        </p:txBody>
-      </p:sp>
-      <p:sp>
-        <p:nvSpPr>
-          <p:cNvPr id="3" name="Subtitle 2">
-            <a:extLst>
-              <a:ext uri="{FF2B5EF4-FFF2-40B4-BE49-F238E27FC236}">
-                <a16:creationId xmlns:a16="http://schemas.microsoft.com/office/drawing/2014/main" id="{1F579C3D-8773-4BAF-B0E2-847945ECA23E}"/>
-              </a:ext>
-            </a:extLst>
-          </p:cNvPr>
-          <p:cNvSpPr>
-            <a:spLocks noGrp="1"/>
-          </p:cNvSpPr>
-          <p:nvPr>
-            <p:ph type="subTitle" idx="1"/>
+              <a:rPr lang="en-SG" dirty="0" smtClean="0"/>
+              <a:t>Test vs Implementation</a:t>
+            </a:r>
+            <a:endParaRPr lang="en-SG" dirty="0"/>
+          </a:p>
+        </p:txBody>
+      </p:sp>
+      <p:sp>
+        <p:nvSpPr>
+          <p:cNvPr id="3" name="Slide Number Placeholder 2"/>
+          <p:cNvSpPr>
+            <a:spLocks noGrp="1"/>
+          </p:cNvSpPr>
+          <p:nvPr>
+            <p:ph type="sldNum" sz="quarter" idx="12"/>
           </p:nvPr>
         </p:nvSpPr>
         <p:spPr/>
@@ -5913,20 +6981,508 @@
           <a:bodyPr/>
           <a:lstStyle/>
           <a:p>
-            <a:r>
-              <a:rPr lang="en-US" dirty="0"/>
-              <a:t>Project-1-Planning</a:t>
-            </a:r>
-            <a:endParaRPr lang="en-US" dirty="0"/>
-          </a:p>
-          <a:p>
-            <a:r>
-              <a:rPr lang="en-US" dirty="0">
-                <a:solidFill>
-                  <a:srgbClr val="FF0000"/>
-                </a:solidFill>
-              </a:rPr>
-              <a:t>End</a:t>
+            <a:fld id="{CAB166B3-F268-4CEF-878A-CFB0D0D505D3}" type="slidenum">
+              <a:rPr lang="en-US" smtClean="0"/>
+              <a:t>9</a:t>
+            </a:fld>
+            <a:endParaRPr lang="en-US"/>
+          </a:p>
+        </p:txBody>
+      </p:sp>
+      <p:grpSp>
+        <p:nvGrpSpPr>
+          <p:cNvPr id="25" name="Group 24"/>
+          <p:cNvGrpSpPr/>
+          <p:nvPr/>
+        </p:nvGrpSpPr>
+        <p:grpSpPr>
+          <a:xfrm>
+            <a:off x="246771" y="1690689"/>
+            <a:ext cx="4194602" cy="2823706"/>
+            <a:chOff x="246771" y="1690689"/>
+            <a:chExt cx="4194602" cy="2823706"/>
+          </a:xfrm>
+        </p:grpSpPr>
+        <p:pic>
+          <p:nvPicPr>
+            <p:cNvPr id="6" name="Picture 5"/>
+            <p:cNvPicPr>
+              <a:picLocks noChangeAspect="1"/>
+            </p:cNvPicPr>
+            <p:nvPr/>
+          </p:nvPicPr>
+          <p:blipFill>
+            <a:blip r:embed="rId2"/>
+            <a:stretch>
+              <a:fillRect/>
+            </a:stretch>
+          </p:blipFill>
+          <p:spPr>
+            <a:xfrm>
+              <a:off x="847045" y="1690689"/>
+              <a:ext cx="3594328" cy="2412088"/>
+            </a:xfrm>
+            <a:prstGeom prst="rect">
+              <a:avLst/>
+            </a:prstGeom>
+          </p:spPr>
+        </p:pic>
+        <p:cxnSp>
+          <p:nvCxnSpPr>
+            <p:cNvPr id="8" name="Straight Connector 7"/>
+            <p:cNvCxnSpPr/>
+            <p:nvPr/>
+          </p:nvCxnSpPr>
+          <p:spPr>
+            <a:xfrm>
+              <a:off x="847045" y="4173961"/>
+              <a:ext cx="3594328" cy="32657"/>
+            </a:xfrm>
+            <a:prstGeom prst="line">
+              <a:avLst/>
+            </a:prstGeom>
+            <a:ln w="19050">
+              <a:solidFill>
+                <a:schemeClr val="tx1"/>
+              </a:solidFill>
+              <a:headEnd type="triangle" w="lg" len="med"/>
+              <a:tailEnd type="triangle" w="lg" len="med"/>
+            </a:ln>
+          </p:spPr>
+          <p:style>
+            <a:lnRef idx="1">
+              <a:schemeClr val="accent1"/>
+            </a:lnRef>
+            <a:fillRef idx="0">
+              <a:schemeClr val="accent1"/>
+            </a:fillRef>
+            <a:effectRef idx="0">
+              <a:schemeClr val="accent1"/>
+            </a:effectRef>
+            <a:fontRef idx="minor">
+              <a:schemeClr val="tx1"/>
+            </a:fontRef>
+          </p:style>
+        </p:cxnSp>
+        <p:sp>
+          <p:nvSpPr>
+            <p:cNvPr id="9" name="TextBox 8"/>
+            <p:cNvSpPr txBox="1"/>
+            <p:nvPr/>
+          </p:nvSpPr>
+          <p:spPr>
+            <a:xfrm>
+              <a:off x="2057400" y="4206618"/>
+              <a:ext cx="829073" cy="307777"/>
+            </a:xfrm>
+            <a:prstGeom prst="rect">
+              <a:avLst/>
+            </a:prstGeom>
+            <a:noFill/>
+          </p:spPr>
+          <p:txBody>
+            <a:bodyPr wrap="none" rtlCol="0">
+              <a:spAutoFit/>
+            </a:bodyPr>
+            <a:lstStyle/>
+            <a:p>
+              <a:r>
+                <a:rPr lang="en-SG" sz="1400" dirty="0" smtClean="0"/>
+                <a:t>68.6 mm</a:t>
+              </a:r>
+              <a:endParaRPr lang="en-SG" sz="1400" dirty="0"/>
+            </a:p>
+          </p:txBody>
+        </p:sp>
+        <p:cxnSp>
+          <p:nvCxnSpPr>
+            <p:cNvPr id="14" name="Straight Connector 13"/>
+            <p:cNvCxnSpPr/>
+            <p:nvPr/>
+          </p:nvCxnSpPr>
+          <p:spPr>
+            <a:xfrm flipH="1" flipV="1">
+              <a:off x="751114" y="1690689"/>
+              <a:ext cx="682" cy="2499602"/>
+            </a:xfrm>
+            <a:prstGeom prst="line">
+              <a:avLst/>
+            </a:prstGeom>
+            <a:ln w="19050">
+              <a:solidFill>
+                <a:schemeClr val="tx1"/>
+              </a:solidFill>
+              <a:headEnd type="triangle" w="lg" len="med"/>
+              <a:tailEnd type="triangle" w="lg" len="med"/>
+            </a:ln>
+          </p:spPr>
+          <p:style>
+            <a:lnRef idx="1">
+              <a:schemeClr val="accent1"/>
+            </a:lnRef>
+            <a:fillRef idx="0">
+              <a:schemeClr val="accent1"/>
+            </a:fillRef>
+            <a:effectRef idx="0">
+              <a:schemeClr val="accent1"/>
+            </a:effectRef>
+            <a:fontRef idx="minor">
+              <a:schemeClr val="tx1"/>
+            </a:fontRef>
+          </p:style>
+        </p:cxnSp>
+        <p:sp>
+          <p:nvSpPr>
+            <p:cNvPr id="19" name="TextBox 18"/>
+            <p:cNvSpPr txBox="1"/>
+            <p:nvPr/>
+          </p:nvSpPr>
+          <p:spPr>
+            <a:xfrm>
+              <a:off x="246771" y="2451153"/>
+              <a:ext cx="503664" cy="523220"/>
+            </a:xfrm>
+            <a:prstGeom prst="rect">
+              <a:avLst/>
+            </a:prstGeom>
+            <a:noFill/>
+          </p:spPr>
+          <p:txBody>
+            <a:bodyPr wrap="none" rtlCol="0">
+              <a:spAutoFit/>
+            </a:bodyPr>
+            <a:lstStyle/>
+            <a:p>
+              <a:r>
+                <a:rPr lang="en-SG" sz="1400" dirty="0" smtClean="0"/>
+                <a:t>53.3</a:t>
+              </a:r>
+              <a:br>
+                <a:rPr lang="en-SG" sz="1400" dirty="0" smtClean="0"/>
+              </a:br>
+              <a:r>
+                <a:rPr lang="en-SG" sz="1400" dirty="0" smtClean="0"/>
+                <a:t>mm</a:t>
+              </a:r>
+              <a:endParaRPr lang="en-SG" sz="1400" dirty="0"/>
+            </a:p>
+          </p:txBody>
+        </p:sp>
+      </p:grpSp>
+      <p:grpSp>
+        <p:nvGrpSpPr>
+          <p:cNvPr id="24" name="Group 23"/>
+          <p:cNvGrpSpPr/>
+          <p:nvPr/>
+        </p:nvGrpSpPr>
+        <p:grpSpPr>
+          <a:xfrm>
+            <a:off x="246771" y="4585579"/>
+            <a:ext cx="2572630" cy="1242401"/>
+            <a:chOff x="246771" y="4585579"/>
+            <a:chExt cx="2572630" cy="1242401"/>
+          </a:xfrm>
+        </p:grpSpPr>
+        <p:pic>
+          <p:nvPicPr>
+            <p:cNvPr id="4" name="Picture 3"/>
+            <p:cNvPicPr>
+              <a:picLocks noChangeAspect="1"/>
+            </p:cNvPicPr>
+            <p:nvPr/>
+          </p:nvPicPr>
+          <p:blipFill>
+            <a:blip r:embed="rId3"/>
+            <a:stretch>
+              <a:fillRect/>
+            </a:stretch>
+          </p:blipFill>
+          <p:spPr>
+            <a:xfrm>
+              <a:off x="816430" y="4585579"/>
+              <a:ext cx="2002971" cy="771120"/>
+            </a:xfrm>
+            <a:prstGeom prst="rect">
+              <a:avLst/>
+            </a:prstGeom>
+          </p:spPr>
+        </p:pic>
+        <p:cxnSp>
+          <p:nvCxnSpPr>
+            <p:cNvPr id="12" name="Straight Connector 11"/>
+            <p:cNvCxnSpPr/>
+            <p:nvPr/>
+          </p:nvCxnSpPr>
+          <p:spPr>
+            <a:xfrm>
+              <a:off x="847045" y="5499067"/>
+              <a:ext cx="1972356" cy="21136"/>
+            </a:xfrm>
+            <a:prstGeom prst="line">
+              <a:avLst/>
+            </a:prstGeom>
+            <a:ln w="19050">
+              <a:solidFill>
+                <a:schemeClr val="tx1"/>
+              </a:solidFill>
+              <a:headEnd type="triangle" w="lg" len="med"/>
+              <a:tailEnd type="triangle" w="lg" len="med"/>
+            </a:ln>
+          </p:spPr>
+          <p:style>
+            <a:lnRef idx="1">
+              <a:schemeClr val="accent1"/>
+            </a:lnRef>
+            <a:fillRef idx="0">
+              <a:schemeClr val="accent1"/>
+            </a:fillRef>
+            <a:effectRef idx="0">
+              <a:schemeClr val="accent1"/>
+            </a:effectRef>
+            <a:fontRef idx="minor">
+              <a:schemeClr val="tx1"/>
+            </a:fontRef>
+          </p:style>
+        </p:cxnSp>
+        <p:sp>
+          <p:nvSpPr>
+            <p:cNvPr id="13" name="TextBox 12"/>
+            <p:cNvSpPr txBox="1"/>
+            <p:nvPr/>
+          </p:nvSpPr>
+          <p:spPr>
+            <a:xfrm>
+              <a:off x="1251857" y="5520203"/>
+              <a:ext cx="829073" cy="307777"/>
+            </a:xfrm>
+            <a:prstGeom prst="rect">
+              <a:avLst/>
+            </a:prstGeom>
+            <a:noFill/>
+          </p:spPr>
+          <p:txBody>
+            <a:bodyPr wrap="none" rtlCol="0">
+              <a:spAutoFit/>
+            </a:bodyPr>
+            <a:lstStyle/>
+            <a:p>
+              <a:r>
+                <a:rPr lang="en-SG" sz="1400" dirty="0" smtClean="0"/>
+                <a:t>43.2 mm</a:t>
+              </a:r>
+              <a:endParaRPr lang="en-SG" sz="1400" dirty="0"/>
+            </a:p>
+          </p:txBody>
+        </p:sp>
+        <p:cxnSp>
+          <p:nvCxnSpPr>
+            <p:cNvPr id="20" name="Straight Connector 19"/>
+            <p:cNvCxnSpPr/>
+            <p:nvPr/>
+          </p:nvCxnSpPr>
+          <p:spPr>
+            <a:xfrm flipV="1">
+              <a:off x="750434" y="4585579"/>
+              <a:ext cx="0" cy="837793"/>
+            </a:xfrm>
+            <a:prstGeom prst="line">
+              <a:avLst/>
+            </a:prstGeom>
+            <a:ln w="19050">
+              <a:solidFill>
+                <a:schemeClr val="tx1"/>
+              </a:solidFill>
+              <a:headEnd type="triangle" w="lg" len="med"/>
+              <a:tailEnd type="triangle" w="lg" len="med"/>
+            </a:ln>
+          </p:spPr>
+          <p:style>
+            <a:lnRef idx="1">
+              <a:schemeClr val="accent1"/>
+            </a:lnRef>
+            <a:fillRef idx="0">
+              <a:schemeClr val="accent1"/>
+            </a:fillRef>
+            <a:effectRef idx="0">
+              <a:schemeClr val="accent1"/>
+            </a:effectRef>
+            <a:fontRef idx="minor">
+              <a:schemeClr val="tx1"/>
+            </a:fontRef>
+          </p:style>
+        </p:cxnSp>
+        <p:sp>
+          <p:nvSpPr>
+            <p:cNvPr id="22" name="TextBox 21"/>
+            <p:cNvSpPr txBox="1"/>
+            <p:nvPr/>
+          </p:nvSpPr>
+          <p:spPr>
+            <a:xfrm>
+              <a:off x="246771" y="4713860"/>
+              <a:ext cx="503664" cy="523220"/>
+            </a:xfrm>
+            <a:prstGeom prst="rect">
+              <a:avLst/>
+            </a:prstGeom>
+            <a:noFill/>
+          </p:spPr>
+          <p:txBody>
+            <a:bodyPr wrap="none" rtlCol="0">
+              <a:spAutoFit/>
+            </a:bodyPr>
+            <a:lstStyle/>
+            <a:p>
+              <a:r>
+                <a:rPr lang="en-SG" sz="1400" dirty="0" smtClean="0"/>
+                <a:t>17.8</a:t>
+              </a:r>
+              <a:br>
+                <a:rPr lang="en-SG" sz="1400" dirty="0" smtClean="0"/>
+              </a:br>
+              <a:r>
+                <a:rPr lang="en-SG" sz="1400" dirty="0" smtClean="0"/>
+                <a:t>mm</a:t>
+              </a:r>
+              <a:endParaRPr lang="en-SG" sz="1400" dirty="0"/>
+            </a:p>
+          </p:txBody>
+        </p:sp>
+      </p:grpSp>
+      <p:sp>
+        <p:nvSpPr>
+          <p:cNvPr id="26" name="TextBox 25"/>
+          <p:cNvSpPr txBox="1"/>
+          <p:nvPr/>
+        </p:nvSpPr>
+        <p:spPr>
+          <a:xfrm>
+            <a:off x="4572000" y="1712489"/>
+            <a:ext cx="3592286" cy="1754326"/>
+          </a:xfrm>
+          <a:prstGeom prst="rect">
+            <a:avLst/>
+          </a:prstGeom>
+          <a:noFill/>
+        </p:spPr>
+        <p:txBody>
+          <a:bodyPr wrap="square" rtlCol="0">
+            <a:spAutoFit/>
+          </a:bodyPr>
+          <a:lstStyle/>
+          <a:p>
+            <a:r>
+              <a:rPr lang="en-SG" dirty="0" smtClean="0"/>
+              <a:t>All testing to be done with the UNO board</a:t>
+            </a:r>
+          </a:p>
+          <a:p>
+            <a:pPr marL="285750" indent="-285750">
+              <a:buFont typeface="Arial" panose="020B0604020202020204" pitchFamily="34" charset="0"/>
+              <a:buChar char="•"/>
+            </a:pPr>
+            <a:r>
+              <a:rPr lang="en-SG" dirty="0" smtClean="0"/>
+              <a:t>Easy connections</a:t>
+            </a:r>
+          </a:p>
+          <a:p>
+            <a:pPr marL="285750" indent="-285750">
+              <a:buFont typeface="Arial" panose="020B0604020202020204" pitchFamily="34" charset="0"/>
+              <a:buChar char="•"/>
+            </a:pPr>
+            <a:r>
+              <a:rPr lang="en-SG" dirty="0" smtClean="0"/>
+              <a:t>USB &amp; Power</a:t>
+            </a:r>
+          </a:p>
+          <a:p>
+            <a:pPr marL="285750" indent="-285750">
+              <a:buFont typeface="Arial" panose="020B0604020202020204" pitchFamily="34" charset="0"/>
+              <a:buChar char="•"/>
+            </a:pPr>
+            <a:r>
+              <a:rPr lang="en-SG" dirty="0" smtClean="0"/>
+              <a:t>Lots of examples</a:t>
+            </a:r>
+          </a:p>
+          <a:p>
+            <a:pPr marL="285750" indent="-285750">
+              <a:buFont typeface="Arial" panose="020B0604020202020204" pitchFamily="34" charset="0"/>
+              <a:buChar char="•"/>
+            </a:pPr>
+            <a:r>
+              <a:rPr lang="en-SG" dirty="0" smtClean="0"/>
+              <a:t>Easy testing!</a:t>
+            </a:r>
+          </a:p>
+        </p:txBody>
+      </p:sp>
+      <p:sp>
+        <p:nvSpPr>
+          <p:cNvPr id="27" name="TextBox 26"/>
+          <p:cNvSpPr txBox="1"/>
+          <p:nvPr/>
+        </p:nvSpPr>
+        <p:spPr>
+          <a:xfrm>
+            <a:off x="3291285" y="4517088"/>
+            <a:ext cx="4125686" cy="2031325"/>
+          </a:xfrm>
+          <a:prstGeom prst="rect">
+            <a:avLst/>
+          </a:prstGeom>
+          <a:noFill/>
+        </p:spPr>
+        <p:txBody>
+          <a:bodyPr wrap="square" rtlCol="0">
+            <a:spAutoFit/>
+          </a:bodyPr>
+          <a:lstStyle/>
+          <a:p>
+            <a:r>
+              <a:rPr lang="en-SG" dirty="0" smtClean="0"/>
+              <a:t>All implementation to be done with the Nano board</a:t>
+            </a:r>
+          </a:p>
+          <a:p>
+            <a:pPr marL="285750" indent="-285750">
+              <a:buFont typeface="Arial" panose="020B0604020202020204" pitchFamily="34" charset="0"/>
+              <a:buChar char="•"/>
+            </a:pPr>
+            <a:r>
+              <a:rPr lang="en-SG" dirty="0" smtClean="0"/>
+              <a:t>Connections are there (same as UNO)</a:t>
+            </a:r>
+          </a:p>
+          <a:p>
+            <a:pPr marL="285750" indent="-285750">
+              <a:buFont typeface="Arial" panose="020B0604020202020204" pitchFamily="34" charset="0"/>
+              <a:buChar char="•"/>
+            </a:pPr>
+            <a:r>
+              <a:rPr lang="en-SG" dirty="0" smtClean="0"/>
+              <a:t>Mini-USB, No Power (except 5V)</a:t>
+            </a:r>
+          </a:p>
+          <a:p>
+            <a:pPr marL="285750" indent="-285750">
+              <a:buFont typeface="Arial" panose="020B0604020202020204" pitchFamily="34" charset="0"/>
+              <a:buChar char="•"/>
+            </a:pPr>
+            <a:r>
+              <a:rPr lang="en-SG" dirty="0" smtClean="0"/>
+              <a:t>Uses ATMega328 (same processor), so runs the same code</a:t>
+            </a:r>
+          </a:p>
+          <a:p>
+            <a:pPr marL="285750" indent="-285750">
+              <a:buFont typeface="Arial" panose="020B0604020202020204" pitchFamily="34" charset="0"/>
+              <a:buChar char="•"/>
+            </a:pPr>
+            <a:r>
+              <a:rPr lang="en-SG" dirty="0" smtClean="0"/>
+              <a:t>Need to solder wires/pins</a:t>
             </a:r>
           </a:p>
         </p:txBody>
@@ -5934,7 +7490,7 @@
     </p:spTree>
     <p:extLst>
       <p:ext uri="{BB962C8B-B14F-4D97-AF65-F5344CB8AC3E}">
-        <p14:creationId xmlns:p14="http://schemas.microsoft.com/office/powerpoint/2010/main" val="2293809126"/>
+        <p14:creationId xmlns:p14="http://schemas.microsoft.com/office/powerpoint/2010/main" val="1877809252"/>
       </p:ext>
     </p:extLst>
   </p:cSld>

</xml_diff>